<commit_message>
Add and update files.
</commit_message>
<xml_diff>
--- a/lecture-slides/2019-08-26.pptx
+++ b/lecture-slides/2019-08-26.pptx
@@ -213,7 +213,7 @@
           <a:p>
             <a:fld id="{A677DEB0-5AA4-49C7-B0AD-AD047A002C4C}" type="datetimeFigureOut">
               <a:rPr lang="en-US" smtClean="0"/>
-              <a:t>8/19/19</a:t>
+              <a:t>8/20/19</a:t>
             </a:fld>
             <a:endParaRPr lang="en-US"/>
           </a:p>
@@ -2026,7 +2026,7 @@
           <a:p>
             <a:fld id="{1B52E0E1-344B-4E26-B5AD-CE86AB802485}" type="datetimeFigureOut">
               <a:rPr lang="en-US" smtClean="0"/>
-              <a:t>8/19/19</a:t>
+              <a:t>8/20/19</a:t>
             </a:fld>
             <a:endParaRPr lang="en-US"/>
           </a:p>
@@ -2224,7 +2224,7 @@
           <a:p>
             <a:fld id="{1B52E0E1-344B-4E26-B5AD-CE86AB802485}" type="datetimeFigureOut">
               <a:rPr lang="en-US" smtClean="0"/>
-              <a:t>8/19/19</a:t>
+              <a:t>8/20/19</a:t>
             </a:fld>
             <a:endParaRPr lang="en-US"/>
           </a:p>
@@ -2432,7 +2432,7 @@
           <a:p>
             <a:fld id="{1B52E0E1-344B-4E26-B5AD-CE86AB802485}" type="datetimeFigureOut">
               <a:rPr lang="en-US" smtClean="0"/>
-              <a:t>8/19/19</a:t>
+              <a:t>8/20/19</a:t>
             </a:fld>
             <a:endParaRPr lang="en-US"/>
           </a:p>
@@ -2630,7 +2630,7 @@
           <a:p>
             <a:fld id="{1B52E0E1-344B-4E26-B5AD-CE86AB802485}" type="datetimeFigureOut">
               <a:rPr lang="en-US" smtClean="0"/>
-              <a:t>8/19/19</a:t>
+              <a:t>8/20/19</a:t>
             </a:fld>
             <a:endParaRPr lang="en-US"/>
           </a:p>
@@ -2905,7 +2905,7 @@
           <a:p>
             <a:fld id="{1B52E0E1-344B-4E26-B5AD-CE86AB802485}" type="datetimeFigureOut">
               <a:rPr lang="en-US" smtClean="0"/>
-              <a:t>8/19/19</a:t>
+              <a:t>8/20/19</a:t>
             </a:fld>
             <a:endParaRPr lang="en-US"/>
           </a:p>
@@ -3170,7 +3170,7 @@
           <a:p>
             <a:fld id="{1B52E0E1-344B-4E26-B5AD-CE86AB802485}" type="datetimeFigureOut">
               <a:rPr lang="en-US" smtClean="0"/>
-              <a:t>8/19/19</a:t>
+              <a:t>8/20/19</a:t>
             </a:fld>
             <a:endParaRPr lang="en-US"/>
           </a:p>
@@ -3582,7 +3582,7 @@
           <a:p>
             <a:fld id="{1B52E0E1-344B-4E26-B5AD-CE86AB802485}" type="datetimeFigureOut">
               <a:rPr lang="en-US" smtClean="0"/>
-              <a:t>8/19/19</a:t>
+              <a:t>8/20/19</a:t>
             </a:fld>
             <a:endParaRPr lang="en-US"/>
           </a:p>
@@ -3723,7 +3723,7 @@
           <a:p>
             <a:fld id="{1B52E0E1-344B-4E26-B5AD-CE86AB802485}" type="datetimeFigureOut">
               <a:rPr lang="en-US" smtClean="0"/>
-              <a:t>8/19/19</a:t>
+              <a:t>8/20/19</a:t>
             </a:fld>
             <a:endParaRPr lang="en-US"/>
           </a:p>
@@ -3836,7 +3836,7 @@
           <a:p>
             <a:fld id="{1B52E0E1-344B-4E26-B5AD-CE86AB802485}" type="datetimeFigureOut">
               <a:rPr lang="en-US" smtClean="0"/>
-              <a:t>8/19/19</a:t>
+              <a:t>8/20/19</a:t>
             </a:fld>
             <a:endParaRPr lang="en-US"/>
           </a:p>
@@ -4147,7 +4147,7 @@
           <a:p>
             <a:fld id="{1B52E0E1-344B-4E26-B5AD-CE86AB802485}" type="datetimeFigureOut">
               <a:rPr lang="en-US" smtClean="0"/>
-              <a:t>8/19/19</a:t>
+              <a:t>8/20/19</a:t>
             </a:fld>
             <a:endParaRPr lang="en-US"/>
           </a:p>
@@ -4435,7 +4435,7 @@
           <a:p>
             <a:fld id="{1B52E0E1-344B-4E26-B5AD-CE86AB802485}" type="datetimeFigureOut">
               <a:rPr lang="en-US" smtClean="0"/>
-              <a:t>8/19/19</a:t>
+              <a:t>8/20/19</a:t>
             </a:fld>
             <a:endParaRPr lang="en-US"/>
           </a:p>
@@ -4676,7 +4676,7 @@
           <a:p>
             <a:fld id="{1B52E0E1-344B-4E26-B5AD-CE86AB802485}" type="datetimeFigureOut">
               <a:rPr lang="en-US" smtClean="0"/>
-              <a:t>8/19/19</a:t>
+              <a:t>8/20/19</a:t>
             </a:fld>
             <a:endParaRPr lang="en-US"/>
           </a:p>
@@ -5386,14 +5386,14 @@
           <a:p>
             <a:r>
               <a:rPr lang="en-US" sz="4800" dirty="0"/>
-              <a:t>Week 1 / Sprint )</a:t>
+              <a:t>Weeks 1&amp;2 / Sprint 1</a:t>
             </a:r>
             <a:br>
               <a:rPr lang="en-US" sz="4800" dirty="0"/>
             </a:br>
             <a:r>
               <a:rPr lang="en-US" sz="4800" dirty="0"/>
-              <a:t>Activities &amp; Assignments</a:t>
+              <a:t>Activities List &amp; Assignments</a:t>
             </a:r>
           </a:p>
         </p:txBody>
@@ -5961,6 +5961,19 @@
             <a:r>
               <a:rPr lang="en-US" sz="2000" dirty="0"/>
               <a:t>Complete your Introductions and Name Cards</a:t>
+            </a:r>
+          </a:p>
+          <a:p>
+            <a:pPr marL="457200" indent="-457200" algn="l">
+              <a:spcBef>
+                <a:spcPts val="0"/>
+              </a:spcBef>
+              <a:buFont typeface="+mj-lt"/>
+              <a:buAutoNum type="arabicPeriod"/>
+            </a:pPr>
+            <a:r>
+              <a:rPr lang="en-US" sz="2000" dirty="0"/>
+              <a:t>Introduce yourself</a:t>
             </a:r>
           </a:p>
           <a:p>

</xml_diff>